<commit_message>
Update Project 1 - Group 6 Slides_KT.pptx
</commit_message>
<xml_diff>
--- a/Project 1 - Group 6 Slides_KT.pptx
+++ b/Project 1 - Group 6 Slides_KT.pptx
@@ -5,7 +5,7 @@
     <p:sldMasterId id="2147483660" r:id="rId1"/>
   </p:sldMasterIdLst>
   <p:notesMasterIdLst>
-    <p:notesMasterId r:id="rId23"/>
+    <p:notesMasterId r:id="rId26"/>
   </p:notesMasterIdLst>
   <p:sldIdLst>
     <p:sldId id="263" r:id="rId2"/>
@@ -29,6 +29,9 @@
     <p:sldId id="274" r:id="rId20"/>
     <p:sldId id="278" r:id="rId21"/>
     <p:sldId id="279" r:id="rId22"/>
+    <p:sldId id="280" r:id="rId23"/>
+    <p:sldId id="281" r:id="rId24"/>
+    <p:sldId id="282" r:id="rId25"/>
   </p:sldIdLst>
   <p:sldSz cx="12192000" cy="6858000"/>
   <p:notesSz cx="6858000" cy="9144000"/>
@@ -1710,6 +1713,207 @@
     <p:extLst>
       <p:ext uri="{BB962C8B-B14F-4D97-AF65-F5344CB8AC3E}">
         <p14:creationId xmlns:p14="http://schemas.microsoft.com/office/powerpoint/2010/main" val="2525760280"/>
+      </p:ext>
+    </p:extLst>
+  </p:cSld>
+  <p:clrMapOvr>
+    <a:masterClrMapping/>
+  </p:clrMapOvr>
+</p:notes>
+</file>
+
+<file path=ppt/notesSlides/notesSlide21.xml><?xml version="1.0" encoding="utf-8"?>
+<p:notes xmlns:a="http://schemas.openxmlformats.org/drawingml/2006/main" xmlns:r="http://schemas.openxmlformats.org/officeDocument/2006/relationships" xmlns:p="http://schemas.openxmlformats.org/presentationml/2006/main">
+  <p:cSld>
+    <p:spTree>
+      <p:nvGrpSpPr>
+        <p:cNvPr id="1" name=""/>
+        <p:cNvGrpSpPr/>
+        <p:nvPr/>
+      </p:nvGrpSpPr>
+      <p:grpSpPr>
+        <a:xfrm>
+          <a:off x="0" y="0"/>
+          <a:ext cx="0" cy="0"/>
+          <a:chOff x="0" y="0"/>
+          <a:chExt cx="0" cy="0"/>
+        </a:xfrm>
+      </p:grpSpPr>
+      <p:sp>
+        <p:nvSpPr>
+          <p:cNvPr id="2" name="Slide Image Placeholder 1"/>
+          <p:cNvSpPr>
+            <a:spLocks noGrp="1" noRot="1" noChangeAspect="1"/>
+          </p:cNvSpPr>
+          <p:nvPr>
+            <p:ph type="sldImg"/>
+          </p:nvPr>
+        </p:nvSpPr>
+        <p:spPr/>
+      </p:sp>
+      <p:sp>
+        <p:nvSpPr>
+          <p:cNvPr id="3" name="Notes Placeholder 2"/>
+          <p:cNvSpPr>
+            <a:spLocks noGrp="1"/>
+          </p:cNvSpPr>
+          <p:nvPr>
+            <p:ph type="body" idx="1"/>
+          </p:nvPr>
+        </p:nvSpPr>
+        <p:spPr/>
+        <p:txBody>
+          <a:bodyPr/>
+          <a:lstStyle/>
+          <a:p>
+            <a:endParaRPr lang="en-AU" dirty="0"/>
+          </a:p>
+          <a:p>
+            <a:r>
+              <a:rPr lang="en-AU" dirty="0"/>
+              <a:t>Explain key – bigger weight applied to house price, crime, followed by school availability</a:t>
+            </a:r>
+          </a:p>
+          <a:p>
+            <a:endParaRPr lang="en-AU" dirty="0"/>
+          </a:p>
+          <a:p>
+            <a:r>
+              <a:rPr lang="en-AU" dirty="0"/>
+              <a:t>8 are from outer postcodes outer suburbs</a:t>
+            </a:r>
+          </a:p>
+          <a:p>
+            <a:endParaRPr lang="en-AU" dirty="0"/>
+          </a:p>
+        </p:txBody>
+      </p:sp>
+      <p:sp>
+        <p:nvSpPr>
+          <p:cNvPr id="4" name="Slide Number Placeholder 3"/>
+          <p:cNvSpPr>
+            <a:spLocks noGrp="1"/>
+          </p:cNvSpPr>
+          <p:nvPr>
+            <p:ph type="sldNum" sz="quarter" idx="5"/>
+          </p:nvPr>
+        </p:nvSpPr>
+        <p:spPr/>
+        <p:txBody>
+          <a:bodyPr/>
+          <a:lstStyle/>
+          <a:p>
+            <a:fld id="{FB9CC39B-C49B-4CDF-81D8-0F40B6A9403C}" type="slidenum">
+              <a:rPr lang="en-AU" smtClean="0"/>
+              <a:t>22</a:t>
+            </a:fld>
+            <a:endParaRPr lang="en-AU"/>
+          </a:p>
+        </p:txBody>
+      </p:sp>
+    </p:spTree>
+    <p:extLst>
+      <p:ext uri="{BB962C8B-B14F-4D97-AF65-F5344CB8AC3E}">
+        <p14:creationId xmlns:p14="http://schemas.microsoft.com/office/powerpoint/2010/main" val="3047578475"/>
+      </p:ext>
+    </p:extLst>
+  </p:cSld>
+  <p:clrMapOvr>
+    <a:masterClrMapping/>
+  </p:clrMapOvr>
+</p:notes>
+</file>
+
+<file path=ppt/notesSlides/notesSlide22.xml><?xml version="1.0" encoding="utf-8"?>
+<p:notes xmlns:a="http://schemas.openxmlformats.org/drawingml/2006/main" xmlns:r="http://schemas.openxmlformats.org/officeDocument/2006/relationships" xmlns:p="http://schemas.openxmlformats.org/presentationml/2006/main">
+  <p:cSld>
+    <p:spTree>
+      <p:nvGrpSpPr>
+        <p:cNvPr id="1" name=""/>
+        <p:cNvGrpSpPr/>
+        <p:nvPr/>
+      </p:nvGrpSpPr>
+      <p:grpSpPr>
+        <a:xfrm>
+          <a:off x="0" y="0"/>
+          <a:ext cx="0" cy="0"/>
+          <a:chOff x="0" y="0"/>
+          <a:chExt cx="0" cy="0"/>
+        </a:xfrm>
+      </p:grpSpPr>
+      <p:sp>
+        <p:nvSpPr>
+          <p:cNvPr id="2" name="Slide Image Placeholder 1"/>
+          <p:cNvSpPr>
+            <a:spLocks noGrp="1" noRot="1" noChangeAspect="1"/>
+          </p:cNvSpPr>
+          <p:nvPr>
+            <p:ph type="sldImg"/>
+          </p:nvPr>
+        </p:nvSpPr>
+        <p:spPr/>
+      </p:sp>
+      <p:sp>
+        <p:nvSpPr>
+          <p:cNvPr id="3" name="Notes Placeholder 2"/>
+          <p:cNvSpPr>
+            <a:spLocks noGrp="1"/>
+          </p:cNvSpPr>
+          <p:nvPr>
+            <p:ph type="body" idx="1"/>
+          </p:nvPr>
+        </p:nvSpPr>
+        <p:spPr/>
+        <p:txBody>
+          <a:bodyPr/>
+          <a:lstStyle/>
+          <a:p>
+            <a:endParaRPr lang="en-AU" dirty="0"/>
+          </a:p>
+          <a:p>
+            <a:r>
+              <a:rPr lang="en-AU" dirty="0"/>
+              <a:t>Explain key – bigger weight applied to house price, crime,, followed by school availability</a:t>
+            </a:r>
+          </a:p>
+          <a:p>
+            <a:endParaRPr lang="en-AU" dirty="0"/>
+          </a:p>
+          <a:p>
+            <a:r>
+              <a:rPr lang="en-AU" dirty="0"/>
+              <a:t>8 are from outer postcodes</a:t>
+            </a:r>
+          </a:p>
+        </p:txBody>
+      </p:sp>
+      <p:sp>
+        <p:nvSpPr>
+          <p:cNvPr id="4" name="Slide Number Placeholder 3"/>
+          <p:cNvSpPr>
+            <a:spLocks noGrp="1"/>
+          </p:cNvSpPr>
+          <p:nvPr>
+            <p:ph type="sldNum" sz="quarter" idx="5"/>
+          </p:nvPr>
+        </p:nvSpPr>
+        <p:spPr/>
+        <p:txBody>
+          <a:bodyPr/>
+          <a:lstStyle/>
+          <a:p>
+            <a:fld id="{FB9CC39B-C49B-4CDF-81D8-0F40B6A9403C}" type="slidenum">
+              <a:rPr lang="en-AU" smtClean="0"/>
+              <a:t>23</a:t>
+            </a:fld>
+            <a:endParaRPr lang="en-AU"/>
+          </a:p>
+        </p:txBody>
+      </p:sp>
+    </p:spTree>
+    <p:extLst>
+      <p:ext uri="{BB962C8B-B14F-4D97-AF65-F5344CB8AC3E}">
+        <p14:creationId xmlns:p14="http://schemas.microsoft.com/office/powerpoint/2010/main" val="3513411630"/>
       </p:ext>
     </p:extLst>
   </p:cSld>
@@ -8442,29 +8646,17 @@
               <a:rPr lang="en-US" dirty="0">
                 <a:latin typeface="+mj-lt"/>
               </a:rPr>
-              <a:t>Top 10 Postcodes – </a:t>
-            </a:r>
-            <a:r>
-              <a:rPr lang="en-US" dirty="0" err="1">
-                <a:latin typeface="+mj-lt"/>
-              </a:rPr>
-              <a:t>liveability</a:t>
-            </a:r>
-            <a:r>
-              <a:rPr lang="en-US" dirty="0">
-                <a:latin typeface="+mj-lt"/>
-              </a:rPr>
-              <a:t> score</a:t>
+              <a:t>Top 10 Postcodes – liveability score</a:t>
             </a:r>
           </a:p>
         </p:txBody>
       </p:sp>
       <p:pic>
         <p:nvPicPr>
-          <p:cNvPr id="14" name="Picture 13">
-            <a:extLst>
-              <a:ext uri="{FF2B5EF4-FFF2-40B4-BE49-F238E27FC236}">
-                <a16:creationId xmlns:a16="http://schemas.microsoft.com/office/drawing/2014/main" id="{FA83EDA6-4F82-7A9E-2094-C697A65BFB23}"/>
+          <p:cNvPr id="8" name="Picture 7">
+            <a:extLst>
+              <a:ext uri="{FF2B5EF4-FFF2-40B4-BE49-F238E27FC236}">
+                <a16:creationId xmlns:a16="http://schemas.microsoft.com/office/drawing/2014/main" id="{1886C741-B042-65CF-BE35-8C3343A9E354}"/>
               </a:ext>
             </a:extLst>
           </p:cNvPr>
@@ -8481,8 +8673,8 @@
         </p:blipFill>
         <p:spPr>
           <a:xfrm>
-            <a:off x="579986" y="1439171"/>
-            <a:ext cx="5887272" cy="3658111"/>
+            <a:off x="559446" y="1422596"/>
+            <a:ext cx="11073108" cy="3189598"/>
           </a:xfrm>
           <a:prstGeom prst="rect">
             <a:avLst/>
@@ -8493,6 +8685,458 @@
     <p:extLst>
       <p:ext uri="{BB962C8B-B14F-4D97-AF65-F5344CB8AC3E}">
         <p14:creationId xmlns:p14="http://schemas.microsoft.com/office/powerpoint/2010/main" val="1240249605"/>
+      </p:ext>
+    </p:extLst>
+  </p:cSld>
+  <p:clrMapOvr>
+    <a:masterClrMapping/>
+  </p:clrMapOvr>
+</p:sld>
+</file>
+
+<file path=ppt/slides/slide22.xml><?xml version="1.0" encoding="utf-8"?>
+<p:sld xmlns:a="http://schemas.openxmlformats.org/drawingml/2006/main" xmlns:r="http://schemas.openxmlformats.org/officeDocument/2006/relationships" xmlns:p="http://schemas.openxmlformats.org/presentationml/2006/main">
+  <p:cSld>
+    <p:spTree>
+      <p:nvGrpSpPr>
+        <p:cNvPr id="1" name=""/>
+        <p:cNvGrpSpPr/>
+        <p:nvPr/>
+      </p:nvGrpSpPr>
+      <p:grpSpPr>
+        <a:xfrm>
+          <a:off x="0" y="0"/>
+          <a:ext cx="0" cy="0"/>
+          <a:chOff x="0" y="0"/>
+          <a:chExt cx="0" cy="0"/>
+        </a:xfrm>
+      </p:grpSpPr>
+      <p:sp>
+        <p:nvSpPr>
+          <p:cNvPr id="2" name="Title 1">
+            <a:extLst>
+              <a:ext uri="{FF2B5EF4-FFF2-40B4-BE49-F238E27FC236}">
+                <a16:creationId xmlns:a16="http://schemas.microsoft.com/office/drawing/2014/main" id="{CAB6D6DC-14A8-D8C9-2C9B-12DFA2A4289E}"/>
+              </a:ext>
+            </a:extLst>
+          </p:cNvPr>
+          <p:cNvSpPr>
+            <a:spLocks noGrp="1"/>
+          </p:cNvSpPr>
+          <p:nvPr>
+            <p:ph type="title"/>
+          </p:nvPr>
+        </p:nvSpPr>
+        <p:spPr>
+          <a:xfrm>
+            <a:off x="422402" y="211599"/>
+            <a:ext cx="10851735" cy="1739267"/>
+          </a:xfrm>
+        </p:spPr>
+        <p:txBody>
+          <a:bodyPr vert="horz" lIns="91440" tIns="45720" rIns="91440" bIns="45720" rtlCol="0" anchor="t">
+            <a:normAutofit/>
+          </a:bodyPr>
+          <a:lstStyle/>
+          <a:p>
+            <a:r>
+              <a:rPr lang="en-US" dirty="0">
+                <a:latin typeface="+mj-lt"/>
+              </a:rPr>
+              <a:t>Top 10 Postcodes – liveability score</a:t>
+            </a:r>
+          </a:p>
+        </p:txBody>
+      </p:sp>
+      <p:sp>
+        <p:nvSpPr>
+          <p:cNvPr id="5" name="TextBox 4">
+            <a:extLst>
+              <a:ext uri="{FF2B5EF4-FFF2-40B4-BE49-F238E27FC236}">
+                <a16:creationId xmlns:a16="http://schemas.microsoft.com/office/drawing/2014/main" id="{BBDEB8CB-8F81-60D3-3DA5-AF12749C5FE8}"/>
+              </a:ext>
+            </a:extLst>
+          </p:cNvPr>
+          <p:cNvSpPr txBox="1"/>
+          <p:nvPr/>
+        </p:nvSpPr>
+        <p:spPr>
+          <a:xfrm>
+            <a:off x="773723" y="4903596"/>
+            <a:ext cx="4314001" cy="1754326"/>
+          </a:xfrm>
+          <a:prstGeom prst="rect">
+            <a:avLst/>
+          </a:prstGeom>
+          <a:noFill/>
+        </p:spPr>
+        <p:txBody>
+          <a:bodyPr wrap="none" rtlCol="0">
+            <a:spAutoFit/>
+          </a:bodyPr>
+          <a:lstStyle/>
+          <a:p>
+            <a:r>
+              <a:rPr lang="en-AU" dirty="0"/>
+              <a:t>Key:</a:t>
+            </a:r>
+          </a:p>
+          <a:p>
+            <a:r>
+              <a:rPr lang="en-AU" dirty="0"/>
+              <a:t>Hospital, Police Station, Supermarket</a:t>
+            </a:r>
+          </a:p>
+          <a:p>
+            <a:r>
+              <a:rPr lang="en-AU" dirty="0"/>
+              <a:t>0 = none, 1 = has at least one</a:t>
+            </a:r>
+          </a:p>
+          <a:p>
+            <a:endParaRPr lang="en-AU" dirty="0"/>
+          </a:p>
+          <a:p>
+            <a:r>
+              <a:rPr lang="en-AU" dirty="0"/>
+              <a:t>Affordability, Crime, School</a:t>
+            </a:r>
+          </a:p>
+          <a:p>
+            <a:r>
+              <a:rPr lang="en-AU" dirty="0"/>
+              <a:t>1=worst outcome to 5 = best outcome</a:t>
+            </a:r>
+          </a:p>
+        </p:txBody>
+      </p:sp>
+      <p:pic>
+        <p:nvPicPr>
+          <p:cNvPr id="7" name="Picture 6">
+            <a:extLst>
+              <a:ext uri="{FF2B5EF4-FFF2-40B4-BE49-F238E27FC236}">
+                <a16:creationId xmlns:a16="http://schemas.microsoft.com/office/drawing/2014/main" id="{F988E9C0-E85B-C71D-07E8-39E63C5FBDAD}"/>
+              </a:ext>
+            </a:extLst>
+          </p:cNvPr>
+          <p:cNvPicPr>
+            <a:picLocks noChangeAspect="1"/>
+          </p:cNvPicPr>
+          <p:nvPr/>
+        </p:nvPicPr>
+        <p:blipFill>
+          <a:blip r:embed="rId3"/>
+          <a:stretch>
+            <a:fillRect/>
+          </a:stretch>
+        </p:blipFill>
+        <p:spPr>
+          <a:xfrm>
+            <a:off x="1166701" y="1576911"/>
+            <a:ext cx="10107436" cy="3000794"/>
+          </a:xfrm>
+          <a:prstGeom prst="rect">
+            <a:avLst/>
+          </a:prstGeom>
+        </p:spPr>
+      </p:pic>
+    </p:spTree>
+    <p:extLst>
+      <p:ext uri="{BB962C8B-B14F-4D97-AF65-F5344CB8AC3E}">
+        <p14:creationId xmlns:p14="http://schemas.microsoft.com/office/powerpoint/2010/main" val="2931903134"/>
+      </p:ext>
+    </p:extLst>
+  </p:cSld>
+  <p:clrMapOvr>
+    <a:masterClrMapping/>
+  </p:clrMapOvr>
+</p:sld>
+</file>
+
+<file path=ppt/slides/slide23.xml><?xml version="1.0" encoding="utf-8"?>
+<p:sld xmlns:a="http://schemas.openxmlformats.org/drawingml/2006/main" xmlns:r="http://schemas.openxmlformats.org/officeDocument/2006/relationships" xmlns:p="http://schemas.openxmlformats.org/presentationml/2006/main">
+  <p:cSld>
+    <p:spTree>
+      <p:nvGrpSpPr>
+        <p:cNvPr id="1" name=""/>
+        <p:cNvGrpSpPr/>
+        <p:nvPr/>
+      </p:nvGrpSpPr>
+      <p:grpSpPr>
+        <a:xfrm>
+          <a:off x="0" y="0"/>
+          <a:ext cx="0" cy="0"/>
+          <a:chOff x="0" y="0"/>
+          <a:chExt cx="0" cy="0"/>
+        </a:xfrm>
+      </p:grpSpPr>
+      <p:sp>
+        <p:nvSpPr>
+          <p:cNvPr id="2" name="Title 1">
+            <a:extLst>
+              <a:ext uri="{FF2B5EF4-FFF2-40B4-BE49-F238E27FC236}">
+                <a16:creationId xmlns:a16="http://schemas.microsoft.com/office/drawing/2014/main" id="{CAB6D6DC-14A8-D8C9-2C9B-12DFA2A4289E}"/>
+              </a:ext>
+            </a:extLst>
+          </p:cNvPr>
+          <p:cNvSpPr>
+            <a:spLocks noGrp="1"/>
+          </p:cNvSpPr>
+          <p:nvPr>
+            <p:ph type="title"/>
+          </p:nvPr>
+        </p:nvSpPr>
+        <p:spPr/>
+        <p:txBody>
+          <a:bodyPr vert="horz" lIns="91440" tIns="45720" rIns="91440" bIns="45720" rtlCol="0" anchor="t">
+            <a:normAutofit/>
+          </a:bodyPr>
+          <a:lstStyle/>
+          <a:p>
+            <a:r>
+              <a:rPr lang="en-US" dirty="0">
+                <a:latin typeface="+mj-lt"/>
+              </a:rPr>
+              <a:t>Summary</a:t>
+            </a:r>
+          </a:p>
+        </p:txBody>
+      </p:sp>
+      <p:sp>
+        <p:nvSpPr>
+          <p:cNvPr id="3" name="Content Placeholder 2">
+            <a:extLst>
+              <a:ext uri="{FF2B5EF4-FFF2-40B4-BE49-F238E27FC236}">
+                <a16:creationId xmlns:a16="http://schemas.microsoft.com/office/drawing/2014/main" id="{9CC7BE90-0535-5306-7742-030DFC67B5F8}"/>
+              </a:ext>
+            </a:extLst>
+          </p:cNvPr>
+          <p:cNvSpPr>
+            <a:spLocks noGrp="1"/>
+          </p:cNvSpPr>
+          <p:nvPr>
+            <p:ph sz="half" idx="1"/>
+          </p:nvPr>
+        </p:nvSpPr>
+        <p:spPr/>
+        <p:txBody>
+          <a:bodyPr/>
+          <a:lstStyle/>
+          <a:p>
+            <a:r>
+              <a:rPr lang="en-AU" dirty="0"/>
+              <a:t>Most liveable postcodes are located in the Outer suburb group, then Mid suburb groups</a:t>
+            </a:r>
+          </a:p>
+          <a:p>
+            <a:r>
+              <a:rPr lang="en-AU" dirty="0"/>
+              <a:t>Inner suburbs all rank 119</a:t>
+            </a:r>
+            <a:r>
+              <a:rPr lang="en-AU" baseline="30000" dirty="0"/>
+              <a:t>th</a:t>
+            </a:r>
+            <a:r>
+              <a:rPr lang="en-AU" dirty="0"/>
+              <a:t> place and lower, based on affordability, with a minimum median house price of $1.3 million for postcode 3066 Collingwood, and maximum postcode 3206 Albert Park, Middle Park.</a:t>
+            </a:r>
+          </a:p>
+          <a:p>
+            <a:endParaRPr lang="en-AU" dirty="0"/>
+          </a:p>
+          <a:p>
+            <a:endParaRPr lang="en-AU" dirty="0"/>
+          </a:p>
+          <a:p>
+            <a:endParaRPr lang="en-AU" dirty="0"/>
+          </a:p>
+        </p:txBody>
+      </p:sp>
+      <p:sp>
+        <p:nvSpPr>
+          <p:cNvPr id="4" name="Content Placeholder 3">
+            <a:extLst>
+              <a:ext uri="{FF2B5EF4-FFF2-40B4-BE49-F238E27FC236}">
+                <a16:creationId xmlns:a16="http://schemas.microsoft.com/office/drawing/2014/main" id="{5971293C-AC62-35C7-8684-55FA2782A84A}"/>
+              </a:ext>
+            </a:extLst>
+          </p:cNvPr>
+          <p:cNvSpPr>
+            <a:spLocks noGrp="1"/>
+          </p:cNvSpPr>
+          <p:nvPr>
+            <p:ph sz="half" idx="2"/>
+          </p:nvPr>
+        </p:nvSpPr>
+        <p:spPr/>
+        <p:txBody>
+          <a:bodyPr/>
+          <a:lstStyle/>
+          <a:p>
+            <a:endParaRPr lang="en-AU"/>
+          </a:p>
+        </p:txBody>
+      </p:sp>
+    </p:spTree>
+    <p:extLst>
+      <p:ext uri="{BB962C8B-B14F-4D97-AF65-F5344CB8AC3E}">
+        <p14:creationId xmlns:p14="http://schemas.microsoft.com/office/powerpoint/2010/main" val="2483209165"/>
+      </p:ext>
+    </p:extLst>
+  </p:cSld>
+  <p:clrMapOvr>
+    <a:masterClrMapping/>
+  </p:clrMapOvr>
+</p:sld>
+</file>
+
+<file path=ppt/slides/slide24.xml><?xml version="1.0" encoding="utf-8"?>
+<p:sld xmlns:a="http://schemas.openxmlformats.org/drawingml/2006/main" xmlns:r="http://schemas.openxmlformats.org/officeDocument/2006/relationships" xmlns:p="http://schemas.openxmlformats.org/presentationml/2006/main">
+  <p:cSld>
+    <p:spTree>
+      <p:nvGrpSpPr>
+        <p:cNvPr id="1" name=""/>
+        <p:cNvGrpSpPr/>
+        <p:nvPr/>
+      </p:nvGrpSpPr>
+      <p:grpSpPr>
+        <a:xfrm>
+          <a:off x="0" y="0"/>
+          <a:ext cx="0" cy="0"/>
+          <a:chOff x="0" y="0"/>
+          <a:chExt cx="0" cy="0"/>
+        </a:xfrm>
+      </p:grpSpPr>
+      <p:sp>
+        <p:nvSpPr>
+          <p:cNvPr id="2" name="Title 1">
+            <a:extLst>
+              <a:ext uri="{FF2B5EF4-FFF2-40B4-BE49-F238E27FC236}">
+                <a16:creationId xmlns:a16="http://schemas.microsoft.com/office/drawing/2014/main" id="{EAD4F5EA-7497-58BC-D4AD-A281C2177FE9}"/>
+              </a:ext>
+            </a:extLst>
+          </p:cNvPr>
+          <p:cNvSpPr>
+            <a:spLocks noGrp="1"/>
+          </p:cNvSpPr>
+          <p:nvPr>
+            <p:ph type="title"/>
+          </p:nvPr>
+        </p:nvSpPr>
+        <p:spPr/>
+        <p:txBody>
+          <a:bodyPr/>
+          <a:lstStyle/>
+          <a:p>
+            <a:endParaRPr lang="en-AU"/>
+          </a:p>
+        </p:txBody>
+      </p:sp>
+      <p:sp>
+        <p:nvSpPr>
+          <p:cNvPr id="3" name="Text Placeholder 2">
+            <a:extLst>
+              <a:ext uri="{FF2B5EF4-FFF2-40B4-BE49-F238E27FC236}">
+                <a16:creationId xmlns:a16="http://schemas.microsoft.com/office/drawing/2014/main" id="{BA35CB88-5D38-5F49-0A79-47800AB5A756}"/>
+              </a:ext>
+            </a:extLst>
+          </p:cNvPr>
+          <p:cNvSpPr>
+            <a:spLocks noGrp="1"/>
+          </p:cNvSpPr>
+          <p:nvPr>
+            <p:ph type="body" idx="1"/>
+          </p:nvPr>
+        </p:nvSpPr>
+        <p:spPr/>
+        <p:txBody>
+          <a:bodyPr/>
+          <a:lstStyle/>
+          <a:p>
+            <a:endParaRPr lang="en-AU"/>
+          </a:p>
+        </p:txBody>
+      </p:sp>
+      <p:sp>
+        <p:nvSpPr>
+          <p:cNvPr id="4" name="Content Placeholder 3">
+            <a:extLst>
+              <a:ext uri="{FF2B5EF4-FFF2-40B4-BE49-F238E27FC236}">
+                <a16:creationId xmlns:a16="http://schemas.microsoft.com/office/drawing/2014/main" id="{11901EF2-EF27-6514-8BF4-E1639632E210}"/>
+              </a:ext>
+            </a:extLst>
+          </p:cNvPr>
+          <p:cNvSpPr>
+            <a:spLocks noGrp="1"/>
+          </p:cNvSpPr>
+          <p:nvPr>
+            <p:ph sz="half" idx="2"/>
+          </p:nvPr>
+        </p:nvSpPr>
+        <p:spPr/>
+        <p:txBody>
+          <a:bodyPr/>
+          <a:lstStyle/>
+          <a:p>
+            <a:endParaRPr lang="en-AU"/>
+          </a:p>
+        </p:txBody>
+      </p:sp>
+      <p:sp>
+        <p:nvSpPr>
+          <p:cNvPr id="5" name="Text Placeholder 4">
+            <a:extLst>
+              <a:ext uri="{FF2B5EF4-FFF2-40B4-BE49-F238E27FC236}">
+                <a16:creationId xmlns:a16="http://schemas.microsoft.com/office/drawing/2014/main" id="{721503C1-0696-2777-3BBE-209D78F0A9B9}"/>
+              </a:ext>
+            </a:extLst>
+          </p:cNvPr>
+          <p:cNvSpPr>
+            <a:spLocks noGrp="1"/>
+          </p:cNvSpPr>
+          <p:nvPr>
+            <p:ph type="body" sz="quarter" idx="3"/>
+          </p:nvPr>
+        </p:nvSpPr>
+        <p:spPr/>
+        <p:txBody>
+          <a:bodyPr/>
+          <a:lstStyle/>
+          <a:p>
+            <a:endParaRPr lang="en-AU"/>
+          </a:p>
+        </p:txBody>
+      </p:sp>
+      <p:sp>
+        <p:nvSpPr>
+          <p:cNvPr id="6" name="Content Placeholder 5">
+            <a:extLst>
+              <a:ext uri="{FF2B5EF4-FFF2-40B4-BE49-F238E27FC236}">
+                <a16:creationId xmlns:a16="http://schemas.microsoft.com/office/drawing/2014/main" id="{ECAD7E44-D98D-C6FA-5D70-DE02E542C2F7}"/>
+              </a:ext>
+            </a:extLst>
+          </p:cNvPr>
+          <p:cNvSpPr>
+            <a:spLocks noGrp="1"/>
+          </p:cNvSpPr>
+          <p:nvPr>
+            <p:ph sz="quarter" idx="4"/>
+          </p:nvPr>
+        </p:nvSpPr>
+        <p:spPr/>
+        <p:txBody>
+          <a:bodyPr/>
+          <a:lstStyle/>
+          <a:p>
+            <a:endParaRPr lang="en-AU"/>
+          </a:p>
+        </p:txBody>
+      </p:sp>
+    </p:spTree>
+    <p:extLst>
+      <p:ext uri="{BB962C8B-B14F-4D97-AF65-F5344CB8AC3E}">
+        <p14:creationId xmlns:p14="http://schemas.microsoft.com/office/powerpoint/2010/main" val="2589265241"/>
       </p:ext>
     </p:extLst>
   </p:cSld>

</xml_diff>